<commit_message>
Đề xuất quy tắc viết mã lệnh trong R Phiên bản 0.1
</commit_message>
<xml_diff>
--- a/qms/guideline/Guideline_R Coding Convention.pptx
+++ b/qms/guideline/Guideline_R Coding Convention.pptx
@@ -5,10 +5,10 @@
     <p:sldMasterId id="2147483708" r:id="rId1"/>
   </p:sldMasterIdLst>
   <p:notesMasterIdLst>
-    <p:notesMasterId r:id="rId12"/>
+    <p:notesMasterId r:id="rId13"/>
   </p:notesMasterIdLst>
   <p:handoutMasterIdLst>
-    <p:handoutMasterId r:id="rId13"/>
+    <p:handoutMasterId r:id="rId14"/>
   </p:handoutMasterIdLst>
   <p:sldIdLst>
     <p:sldId id="256" r:id="rId2"/>
@@ -19,13 +19,14 @@
     <p:sldId id="262" r:id="rId7"/>
     <p:sldId id="263" r:id="rId8"/>
     <p:sldId id="265" r:id="rId9"/>
-    <p:sldId id="260" r:id="rId10"/>
-    <p:sldId id="266" r:id="rId11"/>
+    <p:sldId id="267" r:id="rId10"/>
+    <p:sldId id="260" r:id="rId11"/>
+    <p:sldId id="266" r:id="rId12"/>
   </p:sldIdLst>
   <p:sldSz cx="9144000" cy="6858000" type="screen4x3"/>
   <p:notesSz cx="6858000" cy="9144000"/>
   <p:custDataLst>
-    <p:tags r:id="rId14"/>
+    <p:tags r:id="rId15"/>
   </p:custDataLst>
   <p:defaultTextStyle>
     <a:defPPr>
@@ -2426,11 +2427,7 @@
         <a:p>
           <a:r>
             <a:rPr lang="en-US" smtClean="0"/>
-            <a:t>Phần giới </a:t>
-          </a:r>
-          <a:r>
-            <a:rPr lang="en-US" smtClean="0"/>
-            <a:t>thiệu file</a:t>
+            <a:t>Phần giới thiệu file</a:t>
           </a:r>
           <a:endParaRPr lang="en-US"/>
         </a:p>
@@ -2504,11 +2501,7 @@
         <a:p>
           <a:r>
             <a:rPr lang="en-US" smtClean="0"/>
-            <a:t>Định </a:t>
-          </a:r>
-          <a:r>
-            <a:rPr lang="en-US" smtClean="0"/>
-            <a:t>dạng mã lệnh</a:t>
+            <a:t>Định dạng mã lệnh</a:t>
           </a:r>
           <a:endParaRPr lang="en-US"/>
         </a:p>
@@ -2744,8 +2737,8 @@
   <dgm:cxnLst>
     <dgm:cxn modelId="{38DB2F17-2E29-4B7C-9F86-DE822B050033}" srcId="{5C522459-F149-4B50-8AC9-2210D8019855}" destId="{008B09B6-D489-4F07-AA63-35F8C7F4AF3B}" srcOrd="1" destOrd="0" parTransId="{BC397700-D351-43F4-BA9A-380FD2C2CFB3}" sibTransId="{948C320E-9416-426A-B98A-4E68227EBBA2}"/>
     <dgm:cxn modelId="{8E892CC4-1C0E-4F5C-83F9-EE9042D16B3B}" srcId="{5C522459-F149-4B50-8AC9-2210D8019855}" destId="{EC44B3D9-E23E-4F81-9064-FC36BA963379}" srcOrd="0" destOrd="0" parTransId="{68E0A091-00E4-4981-A170-C53FCEE90B03}" sibTransId="{74E126FA-27DA-47D3-B30E-B0DBFC922FE5}"/>
+    <dgm:cxn modelId="{3BAD5DB5-7321-4DA9-B550-F390FCAF2C29}" type="presOf" srcId="{008B09B6-D489-4F07-AA63-35F8C7F4AF3B}" destId="{3F6C120A-B485-4CF2-B1C5-94887D31FC0B}" srcOrd="0" destOrd="0" presId="urn:microsoft.com/office/officeart/2005/8/layout/chevron2"/>
     <dgm:cxn modelId="{E1091FEC-3130-4AF9-9730-B1F3F96F1B2A}" type="presOf" srcId="{17F5E9D5-CBF2-4C93-8066-A3675B7C71CB}" destId="{AF62D34F-9C8D-470B-8ADA-418D804C28DE}" srcOrd="0" destOrd="0" presId="urn:microsoft.com/office/officeart/2005/8/layout/chevron2"/>
-    <dgm:cxn modelId="{3BAD5DB5-7321-4DA9-B550-F390FCAF2C29}" type="presOf" srcId="{008B09B6-D489-4F07-AA63-35F8C7F4AF3B}" destId="{3F6C120A-B485-4CF2-B1C5-94887D31FC0B}" srcOrd="0" destOrd="0" presId="urn:microsoft.com/office/officeart/2005/8/layout/chevron2"/>
     <dgm:cxn modelId="{9163F066-9CA3-4DB3-ADE9-43B728A19AAB}" type="presOf" srcId="{5C522459-F149-4B50-8AC9-2210D8019855}" destId="{BD53E237-3E51-4CFE-8FB8-74B35CE6210C}" srcOrd="0" destOrd="0" presId="urn:microsoft.com/office/officeart/2005/8/layout/chevron2"/>
     <dgm:cxn modelId="{4265FFF1-BA6D-46EB-8393-EFB2243059DE}" srcId="{584C81C7-E728-4B3C-866F-B3CB395C57CF}" destId="{DD434991-2437-4838-95CA-2B4013DE044A}" srcOrd="0" destOrd="0" parTransId="{4A25BEDD-5E20-42A8-80C2-5DC05D361414}" sibTransId="{18ED677A-00FC-4F7A-9890-16837FE02A3D}"/>
     <dgm:cxn modelId="{346CBBA1-20BD-4C44-BBA4-922D8808072A}" type="presOf" srcId="{EC44B3D9-E23E-4F81-9064-FC36BA963379}" destId="{775156BF-002E-4466-B6D0-69F39950ED0A}" srcOrd="0" destOrd="0" presId="urn:microsoft.com/office/officeart/2005/8/layout/chevron2"/>
@@ -3285,6 +3278,13 @@
     <dgm:pt modelId="{3B20AB12-803C-43FB-94FB-0DA23ADF73C8}" type="pres">
       <dgm:prSet presAssocID="{501F8F45-F1FC-4481-BBA5-1755B16031E4}" presName="parentLeftMargin" presStyleLbl="node1" presStyleIdx="1" presStyleCnt="5"/>
       <dgm:spPr/>
+      <dgm:t>
+        <a:bodyPr/>
+        <a:lstStyle/>
+        <a:p>
+          <a:endParaRPr lang="en-US"/>
+        </a:p>
+      </dgm:t>
     </dgm:pt>
     <dgm:pt modelId="{DC82146F-41EE-4752-81CB-9D1E20870BC1}" type="pres">
       <dgm:prSet presAssocID="{501F8F45-F1FC-4481-BBA5-1755B16031E4}" presName="parentText" presStyleLbl="node1" presStyleIdx="2" presStyleCnt="5">
@@ -3325,6 +3325,13 @@
     <dgm:pt modelId="{1C96C81F-CC23-4520-920E-BD1B675FFD54}" type="pres">
       <dgm:prSet presAssocID="{AEC6E6B6-63E0-49C7-8A4C-99720691F900}" presName="parentLeftMargin" presStyleLbl="node1" presStyleIdx="2" presStyleCnt="5"/>
       <dgm:spPr/>
+      <dgm:t>
+        <a:bodyPr/>
+        <a:lstStyle/>
+        <a:p>
+          <a:endParaRPr lang="en-US"/>
+        </a:p>
+      </dgm:t>
     </dgm:pt>
     <dgm:pt modelId="{69CAD6EB-FB06-4FC2-884E-CA4285580B74}" type="pres">
       <dgm:prSet presAssocID="{AEC6E6B6-63E0-49C7-8A4C-99720691F900}" presName="parentText" presStyleLbl="node1" presStyleIdx="3" presStyleCnt="5">
@@ -3407,8 +3414,8 @@
     <dgm:cxn modelId="{6A5DAFD4-EED4-494F-AA57-5C233B4FCEFB}" type="presOf" srcId="{501F8F45-F1FC-4481-BBA5-1755B16031E4}" destId="{DC82146F-41EE-4752-81CB-9D1E20870BC1}" srcOrd="1" destOrd="0" presId="urn:microsoft.com/office/officeart/2005/8/layout/list1"/>
     <dgm:cxn modelId="{8DC1000F-22CD-4276-B721-6A649A7264BA}" srcId="{4D26510B-0620-4EF4-8014-A6C00A5F9053}" destId="{AEC6E6B6-63E0-49C7-8A4C-99720691F900}" srcOrd="3" destOrd="0" parTransId="{E2090458-EDC1-44DF-9431-A36354891C02}" sibTransId="{7787813E-1DE4-4777-B4FF-22C82F38BAB5}"/>
     <dgm:cxn modelId="{A2F9494A-9F0A-4BB9-95BB-F495B2FFDA07}" type="presOf" srcId="{501F8F45-F1FC-4481-BBA5-1755B16031E4}" destId="{3B20AB12-803C-43FB-94FB-0DA23ADF73C8}" srcOrd="0" destOrd="0" presId="urn:microsoft.com/office/officeart/2005/8/layout/list1"/>
+    <dgm:cxn modelId="{AFF895E7-358C-48EC-B224-66D02EFE7006}" type="presOf" srcId="{427DD5A2-41B7-4848-9C9D-3A6E978E14B8}" destId="{24A1AE8C-D108-4ABD-B9F8-B3640369BDC7}" srcOrd="1" destOrd="0" presId="urn:microsoft.com/office/officeart/2005/8/layout/list1"/>
     <dgm:cxn modelId="{DF89DD7E-708D-4853-987C-E3C98C57678B}" srcId="{4D26510B-0620-4EF4-8014-A6C00A5F9053}" destId="{501F8F45-F1FC-4481-BBA5-1755B16031E4}" srcOrd="2" destOrd="0" parTransId="{D44A1B0E-A153-423C-B9DD-18169AAAD83B}" sibTransId="{9D06A3C5-872C-4FFA-85DD-C79C31F1B7EF}"/>
-    <dgm:cxn modelId="{AFF895E7-358C-48EC-B224-66D02EFE7006}" type="presOf" srcId="{427DD5A2-41B7-4848-9C9D-3A6E978E14B8}" destId="{24A1AE8C-D108-4ABD-B9F8-B3640369BDC7}" srcOrd="1" destOrd="0" presId="urn:microsoft.com/office/officeart/2005/8/layout/list1"/>
     <dgm:cxn modelId="{860A761D-15BC-43EB-B4AF-EAB6EFA10EB6}" type="presOf" srcId="{AEC6E6B6-63E0-49C7-8A4C-99720691F900}" destId="{1C96C81F-CC23-4520-920E-BD1B675FFD54}" srcOrd="0" destOrd="0" presId="urn:microsoft.com/office/officeart/2005/8/layout/list1"/>
     <dgm:cxn modelId="{CF28658A-8B15-4854-ADDC-7E19DABE34A7}" type="presOf" srcId="{427DD5A2-41B7-4848-9C9D-3A6E978E14B8}" destId="{8128AAEC-152E-4080-B1E1-DC0E6F5F1B93}" srcOrd="0" destOrd="0" presId="urn:microsoft.com/office/officeart/2005/8/layout/list1"/>
     <dgm:cxn modelId="{5D846EB2-DEBA-4529-9874-70D39CFB3706}" type="presOf" srcId="{C8242D3F-395E-460E-BB53-2E2CFCDAB4E9}" destId="{2480736B-743D-4F5A-85C4-D97E67E8B476}" srcOrd="0" destOrd="0" presId="urn:microsoft.com/office/officeart/2005/8/layout/list1"/>
@@ -3611,11 +3618,7 @@
           </a:pPr>
           <a:r>
             <a:rPr lang="en-US" sz="6300" kern="1200" smtClean="0"/>
-            <a:t>Phần giới </a:t>
-          </a:r>
-          <a:r>
-            <a:rPr lang="en-US" sz="6300" kern="1200" smtClean="0"/>
-            <a:t>thiệu file</a:t>
+            <a:t>Phần giới thiệu file</a:t>
           </a:r>
           <a:endParaRPr lang="en-US" sz="6300" kern="1200"/>
         </a:p>
@@ -3769,11 +3772,7 @@
           </a:pPr>
           <a:r>
             <a:rPr lang="en-US" sz="6300" kern="1200" smtClean="0"/>
-            <a:t>Định </a:t>
-          </a:r>
-          <a:r>
-            <a:rPr lang="en-US" sz="6300" kern="1200" smtClean="0"/>
-            <a:t>dạng mã lệnh</a:t>
+            <a:t>Định dạng mã lệnh</a:t>
           </a:r>
           <a:endParaRPr lang="en-US" sz="6300" kern="1200"/>
         </a:p>
@@ -9156,6 +9155,14 @@
           </a:bodyPr>
           <a:lstStyle/>
           <a:p>
+            <a:r>
+              <a:rPr lang="en-US" smtClean="0"/>
+              <a:t>Khởi</a:t>
+            </a:r>
+            <a:r>
+              <a:rPr lang="en-US" baseline="0" smtClean="0"/>
+              <a:t> tạo: 22/12/2015</a:t>
+            </a:r>
             <a:endParaRPr lang="en-US" dirty="0"/>
           </a:p>
         </p:txBody>
@@ -9448,7 +9455,7 @@
             <a:fld id="{9C608E08-E38F-41E2-988E-DA1CC3EF0C03}" type="slidenum">
               <a:rPr lang="en-US" smtClean="0"/>
               <a:pPr/>
-              <a:t>9</a:t>
+              <a:t>10</a:t>
             </a:fld>
             <a:endParaRPr lang="en-US"/>
           </a:p>
@@ -9554,7 +9561,7 @@
             <a:fld id="{9C608E08-E38F-41E2-988E-DA1CC3EF0C03}" type="slidenum">
               <a:rPr lang="en-US" smtClean="0"/>
               <a:pPr/>
-              <a:t>10</a:t>
+              <a:t>11</a:t>
             </a:fld>
             <a:endParaRPr lang="en-US"/>
           </a:p>
@@ -12791,6 +12798,114 @@
           </a:p>
         </p:txBody>
       </p:sp>
+      <p:sp>
+        <p:nvSpPr>
+          <p:cNvPr id="5" name="Subtitle 2"/>
+          <p:cNvSpPr txBox="1">
+            <a:spLocks/>
+          </p:cNvSpPr>
+          <p:nvPr/>
+        </p:nvSpPr>
+        <p:spPr>
+          <a:xfrm>
+            <a:off x="1371600" y="4114800"/>
+            <a:ext cx="6400800" cy="838200"/>
+          </a:xfrm>
+          <a:prstGeom prst="rect">
+            <a:avLst/>
+          </a:prstGeom>
+        </p:spPr>
+        <p:txBody>
+          <a:bodyPr vert="horz" lIns="91440" tIns="45720" rIns="91440" bIns="45720" rtlCol="0">
+            <a:normAutofit/>
+          </a:bodyPr>
+          <a:lstStyle/>
+          <a:p>
+            <a:pPr marL="0" marR="0" lvl="0" indent="0" algn="ctr" defTabSz="914400" rtl="0" eaLnBrk="1" fontAlgn="auto" latinLnBrk="0" hangingPunct="1">
+              <a:lnSpc>
+                <a:spcPct val="100000"/>
+              </a:lnSpc>
+              <a:spcBef>
+                <a:spcPct val="20000"/>
+              </a:spcBef>
+              <a:spcAft>
+                <a:spcPts val="0"/>
+              </a:spcAft>
+              <a:buClrTx/>
+              <a:buSzTx/>
+              <a:buFont typeface="Wingdings" pitchFamily="2" charset="2"/>
+              <a:buNone/>
+              <a:tabLst/>
+              <a:defRPr/>
+            </a:pPr>
+            <a:r>
+              <a:rPr kumimoji="0" lang="en-US" sz="3200" b="0" i="0" u="none" strike="noStrike" kern="1200" cap="none" spc="0" normalizeH="0" baseline="0" noProof="0" smtClean="0">
+                <a:ln>
+                  <a:noFill/>
+                </a:ln>
+                <a:solidFill>
+                  <a:srgbClr val="CC3300"/>
+                </a:solidFill>
+                <a:effectLst/>
+                <a:uLnTx/>
+                <a:uFillTx/>
+                <a:latin typeface="+mn-lt"/>
+                <a:ea typeface="+mn-ea"/>
+                <a:cs typeface="+mn-cs"/>
+              </a:rPr>
+              <a:t>Phiên</a:t>
+            </a:r>
+            <a:r>
+              <a:rPr kumimoji="0" lang="en-US" sz="3200" b="0" i="0" u="none" strike="noStrike" kern="1200" cap="none" spc="0" normalizeH="0" noProof="0" smtClean="0">
+                <a:ln>
+                  <a:noFill/>
+                </a:ln>
+                <a:solidFill>
+                  <a:srgbClr val="CC3300"/>
+                </a:solidFill>
+                <a:effectLst/>
+                <a:uLnTx/>
+                <a:uFillTx/>
+                <a:latin typeface="+mn-lt"/>
+                <a:ea typeface="+mn-ea"/>
+                <a:cs typeface="+mn-cs"/>
+              </a:rPr>
+              <a:t> bản</a:t>
+            </a:r>
+            <a:r>
+              <a:rPr kumimoji="0" lang="en-US" sz="3200" b="0" i="0" u="none" strike="noStrike" kern="1200" cap="none" spc="0" normalizeH="0" baseline="0" noProof="0" smtClean="0">
+                <a:ln>
+                  <a:noFill/>
+                </a:ln>
+                <a:solidFill>
+                  <a:srgbClr val="CC3300"/>
+                </a:solidFill>
+                <a:effectLst/>
+                <a:uLnTx/>
+                <a:uFillTx/>
+                <a:latin typeface="+mn-lt"/>
+                <a:ea typeface="+mn-ea"/>
+                <a:cs typeface="+mn-cs"/>
+              </a:rPr>
+              <a:t>: 0.1</a:t>
+            </a:r>
+            <a:endParaRPr kumimoji="0" lang="en-US" sz="3200" b="0" i="0" u="none" strike="noStrike" kern="1200" cap="none" spc="0" normalizeH="0" baseline="0" noProof="0" dirty="0">
+              <a:ln>
+                <a:noFill/>
+              </a:ln>
+              <a:solidFill>
+                <a:srgbClr val="CC3300"/>
+              </a:solidFill>
+              <a:effectLst/>
+              <a:uLnTx/>
+              <a:uFillTx/>
+              <a:latin typeface="+mn-lt"/>
+              <a:ea typeface="+mn-ea"/>
+              <a:cs typeface="+mn-cs"/>
+            </a:endParaRPr>
+          </a:p>
+        </p:txBody>
+      </p:sp>
     </p:spTree>
     <p:custDataLst>
       <p:tags r:id="rId1"/>
@@ -12863,6 +12978,230 @@
         <p:spPr/>
         <p:txBody>
           <a:bodyPr>
+            <a:normAutofit fontScale="92500" lnSpcReduction="20000"/>
+          </a:bodyPr>
+          <a:lstStyle/>
+          <a:p>
+            <a:r>
+              <a:rPr lang="en-US" smtClean="0"/>
+              <a:t>Không nên viết 1 dòng thực việc quá nhiều lệnh</a:t>
+            </a:r>
+          </a:p>
+          <a:p>
+            <a:pPr lvl="1"/>
+            <a:r>
+              <a:rPr lang="en-US" smtClean="0"/>
+              <a:t>Nên viết một dòng làm 1 việc càng đơn giản càng tốt</a:t>
+            </a:r>
+          </a:p>
+          <a:p>
+            <a:r>
+              <a:rPr lang="en-US" smtClean="0">
+                <a:solidFill>
+                  <a:schemeClr val="tx1"/>
+                </a:solidFill>
+              </a:rPr>
+              <a:t>Vd:</a:t>
+            </a:r>
+          </a:p>
+          <a:p>
+            <a:pPr>
+              <a:buNone/>
+            </a:pPr>
+            <a:r>
+              <a:rPr lang="en-US" smtClean="0">
+                <a:solidFill>
+                  <a:schemeClr val="tx1"/>
+                </a:solidFill>
+              </a:rPr>
+              <a:t>Thay vì viết 1 lệnh vẽ biểu đồ thanh với màu sắc và legend như sau:</a:t>
+            </a:r>
+          </a:p>
+          <a:p>
+            <a:pPr marL="917575">
+              <a:buNone/>
+            </a:pPr>
+            <a:r>
+              <a:rPr lang="en-US" sz="2400" smtClean="0">
+                <a:solidFill>
+                  <a:srgbClr val="FF0000"/>
+                </a:solidFill>
+              </a:rPr>
+              <a:t>barplot(table(obesity, gender), col =  c("Red", "Blue", "Yellow"), legend.text=c('Normal', 'Overweight', 'Obesity'))</a:t>
+            </a:r>
+          </a:p>
+          <a:p>
+            <a:pPr>
+              <a:buNone/>
+            </a:pPr>
+            <a:r>
+              <a:rPr lang="en-US" sz="2400" u="sng" smtClean="0">
+                <a:solidFill>
+                  <a:schemeClr val="tx1"/>
+                </a:solidFill>
+              </a:rPr>
+              <a:t>Có thể viết thành 5 lệnh</a:t>
+            </a:r>
+            <a:r>
+              <a:rPr lang="en-US" sz="2400" smtClean="0">
+                <a:solidFill>
+                  <a:schemeClr val="tx1"/>
+                </a:solidFill>
+              </a:rPr>
+              <a:t>:</a:t>
+            </a:r>
+          </a:p>
+          <a:p>
+            <a:pPr marL="865188">
+              <a:buNone/>
+            </a:pPr>
+            <a:r>
+              <a:rPr lang="en-US" sz="2400" smtClean="0">
+                <a:solidFill>
+                  <a:schemeClr val="tx1"/>
+                </a:solidFill>
+              </a:rPr>
+              <a:t>legends = c('Normal', 'Overweight', 'Obesity');</a:t>
+            </a:r>
+          </a:p>
+          <a:p>
+            <a:pPr marL="865188">
+              <a:buNone/>
+            </a:pPr>
+            <a:r>
+              <a:rPr lang="en-US" sz="2400" smtClean="0">
+                <a:solidFill>
+                  <a:schemeClr val="tx1"/>
+                </a:solidFill>
+              </a:rPr>
+              <a:t>colors = c("Red", "Blue", "Yellow");</a:t>
+            </a:r>
+          </a:p>
+          <a:p>
+            <a:pPr marL="865188">
+              <a:buNone/>
+            </a:pPr>
+            <a:r>
+              <a:rPr lang="en-US" sz="2400" smtClean="0">
+                <a:solidFill>
+                  <a:schemeClr val="tx1"/>
+                </a:solidFill>
+              </a:rPr>
+              <a:t>tabDat = table(obesity, gender);</a:t>
+            </a:r>
+          </a:p>
+          <a:p>
+            <a:pPr marL="865188">
+              <a:buNone/>
+            </a:pPr>
+            <a:r>
+              <a:rPr lang="en-US" sz="2400" smtClean="0">
+                <a:solidFill>
+                  <a:schemeClr val="tx1"/>
+                </a:solidFill>
+              </a:rPr>
+              <a:t>barplot(tabDate, col = colors, legend.text=legends)</a:t>
+            </a:r>
+            <a:endParaRPr lang="en-US" sz="2400">
+              <a:solidFill>
+                <a:schemeClr val="tx1"/>
+              </a:solidFill>
+            </a:endParaRPr>
+          </a:p>
+        </p:txBody>
+      </p:sp>
+      <p:sp>
+        <p:nvSpPr>
+          <p:cNvPr id="4" name="Slide Number Placeholder 3"/>
+          <p:cNvSpPr>
+            <a:spLocks noGrp="1"/>
+          </p:cNvSpPr>
+          <p:nvPr>
+            <p:ph type="sldNum" sz="quarter" idx="12"/>
+          </p:nvPr>
+        </p:nvSpPr>
+        <p:spPr/>
+        <p:txBody>
+          <a:bodyPr/>
+          <a:lstStyle/>
+          <a:p>
+            <a:fld id="{B6F15528-21DE-4FAA-801E-634DDDAF4B2B}" type="slidenum">
+              <a:rPr lang="en-US" smtClean="0"/>
+              <a:pPr/>
+              <a:t>10</a:t>
+            </a:fld>
+            <a:endParaRPr lang="en-US"/>
+          </a:p>
+        </p:txBody>
+      </p:sp>
+    </p:spTree>
+  </p:cSld>
+  <p:clrMapOvr>
+    <a:masterClrMapping/>
+  </p:clrMapOvr>
+  <p:timing>
+    <p:tnLst>
+      <p:par>
+        <p:cTn id="1" dur="indefinite" restart="never" nodeType="tmRoot"/>
+      </p:par>
+    </p:tnLst>
+  </p:timing>
+</p:sld>
+</file>
+
+<file path=ppt/slides/slide11.xml><?xml version="1.0" encoding="utf-8"?>
+<p:sld xmlns:a="http://schemas.openxmlformats.org/drawingml/2006/main" xmlns:r="http://schemas.openxmlformats.org/officeDocument/2006/relationships" xmlns:p="http://schemas.openxmlformats.org/presentationml/2006/main">
+  <p:cSld>
+    <p:spTree>
+      <p:nvGrpSpPr>
+        <p:cNvPr id="1" name=""/>
+        <p:cNvGrpSpPr/>
+        <p:nvPr/>
+      </p:nvGrpSpPr>
+      <p:grpSpPr>
+        <a:xfrm>
+          <a:off x="0" y="0"/>
+          <a:ext cx="0" cy="0"/>
+          <a:chOff x="0" y="0"/>
+          <a:chExt cx="0" cy="0"/>
+        </a:xfrm>
+      </p:grpSpPr>
+      <p:sp>
+        <p:nvSpPr>
+          <p:cNvPr id="2" name="Title 1"/>
+          <p:cNvSpPr>
+            <a:spLocks noGrp="1"/>
+          </p:cNvSpPr>
+          <p:nvPr>
+            <p:ph type="title"/>
+          </p:nvPr>
+        </p:nvSpPr>
+        <p:spPr/>
+        <p:txBody>
+          <a:bodyPr/>
+          <a:lstStyle/>
+          <a:p>
+            <a:r>
+              <a:rPr lang="en-US" smtClean="0"/>
+              <a:t>Trình bày logic</a:t>
+            </a:r>
+            <a:endParaRPr lang="en-US"/>
+          </a:p>
+        </p:txBody>
+      </p:sp>
+      <p:sp>
+        <p:nvSpPr>
+          <p:cNvPr id="3" name="Content Placeholder 2"/>
+          <p:cNvSpPr>
+            <a:spLocks noGrp="1"/>
+          </p:cNvSpPr>
+          <p:nvPr>
+            <p:ph idx="1"/>
+          </p:nvPr>
+        </p:nvSpPr>
+        <p:spPr/>
+        <p:txBody>
+          <a:bodyPr>
             <a:normAutofit/>
           </a:bodyPr>
           <a:lstStyle/>
@@ -12899,19 +13238,8 @@
                 <a:latin typeface="Arial"/>
                 <a:cs typeface="Arial"/>
               </a:rPr>
-              <a:t>± </a:t>
+              <a:t>± 20 </a:t>
             </a:r>
-            <a:r>
-              <a:rPr lang="en-US" smtClean="0">
-                <a:latin typeface="Arial"/>
-                <a:cs typeface="Arial"/>
-              </a:rPr>
-              <a:t>20 </a:t>
-            </a:r>
-            <a:endParaRPr lang="en-US" smtClean="0">
-              <a:latin typeface="Arial"/>
-              <a:cs typeface="Arial"/>
-            </a:endParaRPr>
           </a:p>
           <a:p>
             <a:pPr lvl="1"/>
@@ -12938,19 +13266,8 @@
                 <a:latin typeface="Arial"/>
                 <a:cs typeface="Arial"/>
               </a:rPr>
-              <a:t>50 (20</a:t>
+              <a:t>50 (20) </a:t>
             </a:r>
-            <a:r>
-              <a:rPr lang="en-US" smtClean="0">
-                <a:latin typeface="Arial"/>
-                <a:cs typeface="Arial"/>
-              </a:rPr>
-              <a:t>) </a:t>
-            </a:r>
-            <a:endParaRPr lang="en-US" smtClean="0">
-              <a:latin typeface="Arial"/>
-              <a:cs typeface="Arial"/>
-            </a:endParaRPr>
           </a:p>
           <a:p>
             <a:pPr lvl="2"/>
@@ -12990,7 +13307,7 @@
             <a:fld id="{B6F15528-21DE-4FAA-801E-634DDDAF4B2B}" type="slidenum">
               <a:rPr lang="en-US" smtClean="0"/>
               <a:pPr/>
-              <a:t>10</a:t>
+              <a:t>11</a:t>
             </a:fld>
             <a:endParaRPr lang="en-US"/>
           </a:p>
@@ -14280,15 +14597,7 @@
           <a:p>
             <a:r>
               <a:rPr lang="en-US" smtClean="0"/>
-              <a:t>Định dạng </a:t>
-            </a:r>
-            <a:r>
-              <a:rPr lang="en-US" smtClean="0"/>
-              <a:t>mã </a:t>
-            </a:r>
-            <a:r>
-              <a:rPr lang="en-US" smtClean="0"/>
-              <a:t>lệnh – tên đối tượng</a:t>
+              <a:t>Định dạng mã lệnh – tên đối tượng</a:t>
             </a:r>
             <a:endParaRPr lang="en-US"/>
           </a:p>
@@ -14334,7 +14643,6 @@
               <a:rPr lang="en-US" smtClean="0"/>
               <a:t>Khi viết tắt các thuật dữ thông dụng thì viết tất cả là chữ thường (nếu bắt đầu tên đối tượng) hoặc TẤT CẢ LÀ CHỮ HOA (nếu là chữ thứ hai trở đi) trong tên đối tượng</a:t>
             </a:r>
-            <a:endParaRPr lang="en-US" smtClean="0"/>
           </a:p>
           <a:p>
             <a:pPr lvl="1">
@@ -14360,23 +14668,7 @@
                   <a:schemeClr val="tx1"/>
                 </a:solidFill>
               </a:rPr>
-              <a:t>bmi </a:t>
-            </a:r>
-            <a:r>
-              <a:rPr lang="en-US" sz="2400" smtClean="0">
-                <a:solidFill>
-                  <a:schemeClr val="tx1"/>
-                </a:solidFill>
-              </a:rPr>
-              <a:t>= </a:t>
-            </a:r>
-            <a:r>
-              <a:rPr lang="en-US" sz="2400" smtClean="0">
-                <a:solidFill>
-                  <a:schemeClr val="tx1"/>
-                </a:solidFill>
-              </a:rPr>
-              <a:t>0.26;                     # Minh họa tên đối tượng viết tắt</a:t>
+              <a:t>bmi = 0.26;                     # Minh họa tên đối tượng viết tắt</a:t>
             </a:r>
           </a:p>
           <a:p>
@@ -14557,29 +14849,8 @@
                   <a:schemeClr val="tx1"/>
                 </a:solidFill>
               </a:rPr>
-              <a:t>data$osteo[tscore1 &lt;= -2.50] = "</a:t>
+              <a:t>data$osteo[tscore1 &lt;= -2.50] = "Yes"</a:t>
             </a:r>
-            <a:r>
-              <a:rPr lang="en-US" smtClean="0">
-                <a:solidFill>
-                  <a:schemeClr val="tx1"/>
-                </a:solidFill>
-              </a:rPr>
-              <a:t>Yes</a:t>
-            </a:r>
-            <a:r>
-              <a:rPr lang="en-US" smtClean="0">
-                <a:solidFill>
-                  <a:schemeClr val="tx1"/>
-                </a:solidFill>
-              </a:rPr>
-              <a:t>"</a:t>
-            </a:r>
-            <a:endParaRPr lang="en-US" smtClean="0">
-              <a:solidFill>
-                <a:schemeClr val="tx1"/>
-              </a:solidFill>
-            </a:endParaRPr>
           </a:p>
         </p:txBody>
       </p:sp>
@@ -14909,11 +15180,6 @@
               </a:rPr>
               <a:t>dat = read.csv(t, header = T) </a:t>
             </a:r>
-            <a:endParaRPr lang="en-US" smtClean="0">
-              <a:solidFill>
-                <a:schemeClr val="tx1"/>
-              </a:solidFill>
-            </a:endParaRPr>
           </a:p>
         </p:txBody>
       </p:sp>
@@ -15087,19 +15353,7 @@
           <a:p>
             <a:r>
               <a:rPr lang="en-US" smtClean="0"/>
-              <a:t>Định dạng mã lệnh </a:t>
-            </a:r>
-            <a:r>
-              <a:rPr lang="en-US" smtClean="0"/>
-              <a:t>– </a:t>
-            </a:r>
-            <a:r>
-              <a:rPr lang="en-US" smtClean="0"/>
-              <a:t>dòng </a:t>
-            </a:r>
-            <a:r>
-              <a:rPr lang="en-US" smtClean="0"/>
-              <a:t>trắng</a:t>
+              <a:t>Định dạng mã lệnh – dòng trắng</a:t>
             </a:r>
             <a:endParaRPr lang="en-US"/>
           </a:p>
@@ -15195,23 +15449,7 @@
                   <a:schemeClr val="tx1"/>
                 </a:solidFill>
               </a:rPr>
-              <a:t>pbc$AGE [age/365 &gt;= 60</a:t>
-            </a:r>
-            <a:r>
-              <a:rPr lang="en-US" sz="2200" smtClean="0">
-                <a:solidFill>
-                  <a:schemeClr val="tx1"/>
-                </a:solidFill>
-              </a:rPr>
-              <a:t>]=</a:t>
-            </a:r>
-            <a:r>
-              <a:rPr lang="en-US" sz="2200" smtClean="0">
-                <a:solidFill>
-                  <a:schemeClr val="tx1"/>
-                </a:solidFill>
-              </a:rPr>
-              <a:t>'gia‘</a:t>
+              <a:t>pbc$AGE [age/365 &gt;= 60]='gia‘</a:t>
             </a:r>
           </a:p>
           <a:p>
@@ -15283,15 +15521,7 @@
                   <a:schemeClr val="tx1"/>
                 </a:solidFill>
               </a:rPr>
-              <a:t>names </a:t>
-            </a:r>
-            <a:r>
-              <a:rPr lang="en-US" sz="2200" smtClean="0">
-                <a:solidFill>
-                  <a:schemeClr val="tx1"/>
-                </a:solidFill>
-              </a:rPr>
-              <a:t>(data)</a:t>
+              <a:t>names (data)</a:t>
             </a:r>
           </a:p>
           <a:p>
@@ -15485,7 +15715,7 @@
           <a:p>
             <a:r>
               <a:rPr lang="en-US" smtClean="0"/>
-              <a:t>Trình bày logic</a:t>
+              <a:t>Định dạng mã lệnh – biểu thức</a:t>
             </a:r>
             <a:endParaRPr lang="en-US"/>
           </a:p>
@@ -15503,31 +15733,12 @@
         </p:nvSpPr>
         <p:spPr/>
         <p:txBody>
-          <a:bodyPr>
-            <a:normAutofit fontScale="92500" lnSpcReduction="20000"/>
-          </a:bodyPr>
+          <a:bodyPr/>
           <a:lstStyle/>
           <a:p>
             <a:r>
               <a:rPr lang="en-US" smtClean="0"/>
-              <a:t>Không nên viết 1 dòng thực việc quá nhiều lệnh</a:t>
-            </a:r>
-          </a:p>
-          <a:p>
-            <a:pPr lvl="1"/>
-            <a:r>
-              <a:rPr lang="en-US" smtClean="0"/>
-              <a:t>Nên viết một dòng làm 1 việc càng đơn giản càng tốt</a:t>
-            </a:r>
-          </a:p>
-          <a:p>
-            <a:r>
-              <a:rPr lang="en-US" smtClean="0">
-                <a:solidFill>
-                  <a:schemeClr val="tx1"/>
-                </a:solidFill>
-              </a:rPr>
-              <a:t>Vd:</a:t>
+              <a:t>Nên có cặp dấu ngoặc () để bao đóng 2 biểu thức &amp; (và) | (hoặc) với nhau</a:t>
             </a:r>
           </a:p>
           <a:p>
@@ -15540,66 +15751,11 @@
                   <a:schemeClr val="tx1"/>
                 </a:solidFill>
               </a:rPr>
-              <a:t>Thay vì viết 1 lệnh vẽ biểu đồ thanh với màu sắc và legend như sau:</a:t>
+              <a:t>Vd:</a:t>
             </a:r>
-            <a:endParaRPr lang="en-US" smtClean="0">
-              <a:solidFill>
-                <a:schemeClr val="tx1"/>
-              </a:solidFill>
-            </a:endParaRPr>
-          </a:p>
-          <a:p>
-            <a:pPr marL="917575">
-              <a:buNone/>
-            </a:pPr>
-            <a:r>
-              <a:rPr lang="en-US" sz="2400" smtClean="0">
-                <a:solidFill>
-                  <a:srgbClr val="FF0000"/>
-                </a:solidFill>
-              </a:rPr>
-              <a:t>barplot(table(obesity, gender), col =  c("Red", "Blue", "Yellow"), legend.text=c('Normal', 'Overweight', </a:t>
-            </a:r>
-            <a:r>
-              <a:rPr lang="en-US" sz="2400" smtClean="0">
-                <a:solidFill>
-                  <a:srgbClr val="FF0000"/>
-                </a:solidFill>
-              </a:rPr>
-              <a:t>'Obesity</a:t>
-            </a:r>
-            <a:r>
-              <a:rPr lang="en-US" sz="2400" smtClean="0">
-                <a:solidFill>
-                  <a:srgbClr val="FF0000"/>
-                </a:solidFill>
-              </a:rPr>
-              <a:t>'))</a:t>
-            </a:r>
           </a:p>
           <a:p>
             <a:pPr>
-              <a:buNone/>
-            </a:pPr>
-            <a:r>
-              <a:rPr lang="en-US" sz="2400" u="sng" smtClean="0">
-                <a:solidFill>
-                  <a:schemeClr val="tx1"/>
-                </a:solidFill>
-              </a:rPr>
-              <a:t>Có thể viết thành 5 lệnh</a:t>
-            </a:r>
-            <a:r>
-              <a:rPr lang="en-US" sz="2400" smtClean="0">
-                <a:solidFill>
-                  <a:schemeClr val="tx1"/>
-                </a:solidFill>
-              </a:rPr>
-              <a:t>:</a:t>
-            </a:r>
-          </a:p>
-          <a:p>
-            <a:pPr marL="865188">
               <a:buNone/>
             </a:pPr>
             <a:r>
@@ -15608,86 +15764,7 @@
                   <a:schemeClr val="tx1"/>
                 </a:solidFill>
               </a:rPr>
-              <a:t>legends = c('Normal', 'Overweight', 'Obesity');</a:t>
-            </a:r>
-          </a:p>
-          <a:p>
-            <a:pPr marL="865188">
-              <a:buNone/>
-            </a:pPr>
-            <a:r>
-              <a:rPr lang="en-US" sz="2400" smtClean="0">
-                <a:solidFill>
-                  <a:schemeClr val="tx1"/>
-                </a:solidFill>
-              </a:rPr>
-              <a:t>colors = c("Red", "Blue", "</a:t>
-            </a:r>
-            <a:r>
-              <a:rPr lang="en-US" sz="2400" smtClean="0">
-                <a:solidFill>
-                  <a:schemeClr val="tx1"/>
-                </a:solidFill>
-              </a:rPr>
-              <a:t>Yellow</a:t>
-            </a:r>
-            <a:r>
-              <a:rPr lang="en-US" sz="2400" smtClean="0">
-                <a:solidFill>
-                  <a:schemeClr val="tx1"/>
-                </a:solidFill>
-              </a:rPr>
-              <a:t>");</a:t>
-            </a:r>
-          </a:p>
-          <a:p>
-            <a:pPr marL="865188">
-              <a:buNone/>
-            </a:pPr>
-            <a:r>
-              <a:rPr lang="en-US" sz="2400" smtClean="0">
-                <a:solidFill>
-                  <a:schemeClr val="tx1"/>
-                </a:solidFill>
-              </a:rPr>
-              <a:t>tabDat = table(obesity, gender);</a:t>
-            </a:r>
-          </a:p>
-          <a:p>
-            <a:pPr marL="865188">
-              <a:buNone/>
-            </a:pPr>
-            <a:r>
-              <a:rPr lang="en-US" sz="2400" smtClean="0">
-                <a:solidFill>
-                  <a:schemeClr val="tx1"/>
-                </a:solidFill>
-              </a:rPr>
-              <a:t>barplot(tabDate, </a:t>
-            </a:r>
-            <a:r>
-              <a:rPr lang="en-US" sz="2400" smtClean="0">
-                <a:solidFill>
-                  <a:schemeClr val="tx1"/>
-                </a:solidFill>
-              </a:rPr>
-              <a:t>col = colors</a:t>
-            </a:r>
-            <a:r>
-              <a:rPr lang="en-US" sz="2400" smtClean="0">
-                <a:solidFill>
-                  <a:schemeClr val="tx1"/>
-                </a:solidFill>
-              </a:rPr>
-              <a:t>, </a:t>
-            </a:r>
-            <a:r>
-              <a:rPr lang="en-US" sz="2400" smtClean="0">
-                <a:solidFill>
-                  <a:schemeClr val="tx1"/>
-                </a:solidFill>
-              </a:rPr>
-              <a:t>legend.text=legends)</a:t>
+              <a:t>data$obesity[(25 &lt;= bmi) &amp; (bmi &lt;= 29.9)] = "Overweight";</a:t>
             </a:r>
             <a:endParaRPr lang="en-US" sz="2400">
               <a:solidFill>
@@ -15721,18 +15798,207 @@
           </a:p>
         </p:txBody>
       </p:sp>
+      <p:cxnSp>
+        <p:nvCxnSpPr>
+          <p:cNvPr id="5" name="Straight Arrow Connector 4"/>
+          <p:cNvCxnSpPr/>
+          <p:nvPr/>
+        </p:nvCxnSpPr>
+        <p:spPr>
+          <a:xfrm flipV="1">
+            <a:off x="2286000" y="3657600"/>
+            <a:ext cx="0" cy="228600"/>
+          </a:xfrm>
+          <a:prstGeom prst="straightConnector1">
+            <a:avLst/>
+          </a:prstGeom>
+          <a:ln>
+            <a:tailEnd type="arrow"/>
+          </a:ln>
+        </p:spPr>
+        <p:style>
+          <a:lnRef idx="2">
+            <a:schemeClr val="accent2"/>
+          </a:lnRef>
+          <a:fillRef idx="0">
+            <a:schemeClr val="accent2"/>
+          </a:fillRef>
+          <a:effectRef idx="1">
+            <a:schemeClr val="accent2"/>
+          </a:effectRef>
+          <a:fontRef idx="minor">
+            <a:schemeClr val="tx1"/>
+          </a:fontRef>
+        </p:style>
+      </p:cxnSp>
+      <p:cxnSp>
+        <p:nvCxnSpPr>
+          <p:cNvPr id="6" name="Straight Arrow Connector 5"/>
+          <p:cNvCxnSpPr/>
+          <p:nvPr/>
+        </p:nvCxnSpPr>
+        <p:spPr>
+          <a:xfrm>
+            <a:off x="2286000" y="3886200"/>
+            <a:ext cx="4114800" cy="0"/>
+          </a:xfrm>
+          <a:prstGeom prst="straightConnector1">
+            <a:avLst/>
+          </a:prstGeom>
+          <a:ln>
+            <a:prstDash val="dash"/>
+            <a:tailEnd type="none"/>
+          </a:ln>
+        </p:spPr>
+        <p:style>
+          <a:lnRef idx="2">
+            <a:schemeClr val="accent2"/>
+          </a:lnRef>
+          <a:fillRef idx="0">
+            <a:schemeClr val="accent2"/>
+          </a:fillRef>
+          <a:effectRef idx="1">
+            <a:schemeClr val="accent2"/>
+          </a:effectRef>
+          <a:fontRef idx="minor">
+            <a:schemeClr val="tx1"/>
+          </a:fontRef>
+        </p:style>
+      </p:cxnSp>
+      <p:sp>
+        <p:nvSpPr>
+          <p:cNvPr id="7" name="TextBox 6"/>
+          <p:cNvSpPr txBox="1"/>
+          <p:nvPr/>
+        </p:nvSpPr>
+        <p:spPr>
+          <a:xfrm>
+            <a:off x="5638800" y="3962400"/>
+            <a:ext cx="3048000" cy="369332"/>
+          </a:xfrm>
+          <a:prstGeom prst="rect">
+            <a:avLst/>
+          </a:prstGeom>
+          <a:noFill/>
+        </p:spPr>
+        <p:txBody>
+          <a:bodyPr wrap="square" rtlCol="0">
+            <a:spAutoFit/>
+          </a:bodyPr>
+          <a:lstStyle/>
+          <a:p>
+            <a:r>
+              <a:rPr lang="en-US" smtClean="0"/>
+              <a:t>Cần có mở ngoặc, đóng ngoặc</a:t>
+            </a:r>
+            <a:endParaRPr lang="en-US"/>
+          </a:p>
+        </p:txBody>
+      </p:sp>
+      <p:cxnSp>
+        <p:nvCxnSpPr>
+          <p:cNvPr id="8" name="Straight Arrow Connector 7"/>
+          <p:cNvCxnSpPr/>
+          <p:nvPr/>
+        </p:nvCxnSpPr>
+        <p:spPr>
+          <a:xfrm flipV="1">
+            <a:off x="3581400" y="3657600"/>
+            <a:ext cx="0" cy="228600"/>
+          </a:xfrm>
+          <a:prstGeom prst="straightConnector1">
+            <a:avLst/>
+          </a:prstGeom>
+          <a:ln>
+            <a:tailEnd type="arrow"/>
+          </a:ln>
+        </p:spPr>
+        <p:style>
+          <a:lnRef idx="2">
+            <a:schemeClr val="accent2"/>
+          </a:lnRef>
+          <a:fillRef idx="0">
+            <a:schemeClr val="accent2"/>
+          </a:fillRef>
+          <a:effectRef idx="1">
+            <a:schemeClr val="accent2"/>
+          </a:effectRef>
+          <a:fontRef idx="minor">
+            <a:schemeClr val="tx1"/>
+          </a:fontRef>
+        </p:style>
+      </p:cxnSp>
+      <p:cxnSp>
+        <p:nvCxnSpPr>
+          <p:cNvPr id="10" name="Straight Arrow Connector 9"/>
+          <p:cNvCxnSpPr/>
+          <p:nvPr/>
+        </p:nvCxnSpPr>
+        <p:spPr>
+          <a:xfrm flipV="1">
+            <a:off x="4038600" y="3657600"/>
+            <a:ext cx="0" cy="228600"/>
+          </a:xfrm>
+          <a:prstGeom prst="straightConnector1">
+            <a:avLst/>
+          </a:prstGeom>
+          <a:ln>
+            <a:tailEnd type="arrow"/>
+          </a:ln>
+        </p:spPr>
+        <p:style>
+          <a:lnRef idx="2">
+            <a:schemeClr val="accent2"/>
+          </a:lnRef>
+          <a:fillRef idx="0">
+            <a:schemeClr val="accent2"/>
+          </a:fillRef>
+          <a:effectRef idx="1">
+            <a:schemeClr val="accent2"/>
+          </a:effectRef>
+          <a:fontRef idx="minor">
+            <a:schemeClr val="tx1"/>
+          </a:fontRef>
+        </p:style>
+      </p:cxnSp>
+      <p:cxnSp>
+        <p:nvCxnSpPr>
+          <p:cNvPr id="11" name="Straight Arrow Connector 10"/>
+          <p:cNvCxnSpPr/>
+          <p:nvPr/>
+        </p:nvCxnSpPr>
+        <p:spPr>
+          <a:xfrm flipV="1">
+            <a:off x="5562600" y="3657600"/>
+            <a:ext cx="0" cy="228600"/>
+          </a:xfrm>
+          <a:prstGeom prst="straightConnector1">
+            <a:avLst/>
+          </a:prstGeom>
+          <a:ln>
+            <a:tailEnd type="arrow"/>
+          </a:ln>
+        </p:spPr>
+        <p:style>
+          <a:lnRef idx="2">
+            <a:schemeClr val="accent2"/>
+          </a:lnRef>
+          <a:fillRef idx="0">
+            <a:schemeClr val="accent2"/>
+          </a:fillRef>
+          <a:effectRef idx="1">
+            <a:schemeClr val="accent2"/>
+          </a:effectRef>
+          <a:fontRef idx="minor">
+            <a:schemeClr val="tx1"/>
+          </a:fontRef>
+        </p:style>
+      </p:cxnSp>
     </p:spTree>
   </p:cSld>
   <p:clrMapOvr>
     <a:masterClrMapping/>
   </p:clrMapOvr>
-  <p:timing>
-    <p:tnLst>
-      <p:par>
-        <p:cTn id="1" dur="indefinite" restart="never" nodeType="tmRoot"/>
-      </p:par>
-    </p:tnLst>
-  </p:timing>
 </p:sld>
 </file>
 
@@ -15752,7 +16018,7 @@
   <p:tag name="ISPRINGONLINEFOLDERPATH" val="Content List"/>
   <p:tag name="ISPRINGCLOUDFOLDERID" val="0"/>
   <p:tag name="ISPRINGCLOUDFOLDERPATH" val="Repository"/>
-  <p:tag name="ISPRING_RESOURCE_PATHS_HASH" val="f237fc9c54d64e2d93854e56a094612fad912f7"/>
+  <p:tag name="ISPRING_RESOURCE_PATHS_HASH" val="c84f1e11e865d190264972812efbdc0e9eaed"/>
 </p:tagLst>
 </file>
 

</xml_diff>